<commit_message>
JIRAMETRICS-25 fix to PPT for module info
</commit_message>
<xml_diff>
--- a/Jira Agile Tips and Tricks 2.pptx
+++ b/Jira Agile Tips and Tricks 2.pptx
@@ -309,7 +309,7 @@
           <a:p>
             <a:fld id="{799B01D3-E541-42FD-B1E6-9E7097F8E480}" type="datetimeFigureOut">
               <a:rPr lang="en-US" smtClean="0"/>
-              <a:t>9/27/2020</a:t>
+              <a:t>10/2/2020</a:t>
             </a:fld>
             <a:endParaRPr lang="en-US"/>
           </a:p>
@@ -477,7 +477,7 @@
           <a:p>
             <a:fld id="{799B01D3-E541-42FD-B1E6-9E7097F8E480}" type="datetimeFigureOut">
               <a:rPr lang="en-US" smtClean="0"/>
-              <a:t>9/27/2020</a:t>
+              <a:t>10/2/2020</a:t>
             </a:fld>
             <a:endParaRPr lang="en-US"/>
           </a:p>
@@ -655,7 +655,7 @@
           <a:p>
             <a:fld id="{799B01D3-E541-42FD-B1E6-9E7097F8E480}" type="datetimeFigureOut">
               <a:rPr lang="en-US" smtClean="0"/>
-              <a:t>9/27/2020</a:t>
+              <a:t>10/2/2020</a:t>
             </a:fld>
             <a:endParaRPr lang="en-US"/>
           </a:p>
@@ -807,7 +807,7 @@
           <a:p>
             <a:fld id="{799B01D3-E541-42FD-B1E6-9E7097F8E480}" type="datetimeFigureOut">
               <a:rPr lang="en-US" smtClean="0"/>
-              <a:t>9/27/2020</a:t>
+              <a:t>10/2/2020</a:t>
             </a:fld>
             <a:endParaRPr lang="en-US"/>
           </a:p>
@@ -1092,7 +1092,7 @@
           <a:p>
             <a:fld id="{799B01D3-E541-42FD-B1E6-9E7097F8E480}" type="datetimeFigureOut">
               <a:rPr lang="en-US" smtClean="0"/>
-              <a:t>9/27/2020</a:t>
+              <a:t>10/2/2020</a:t>
             </a:fld>
             <a:endParaRPr lang="en-US"/>
           </a:p>
@@ -1377,7 +1377,7 @@
           <a:p>
             <a:fld id="{799B01D3-E541-42FD-B1E6-9E7097F8E480}" type="datetimeFigureOut">
               <a:rPr lang="en-US" smtClean="0"/>
-              <a:t>9/27/2020</a:t>
+              <a:t>10/2/2020</a:t>
             </a:fld>
             <a:endParaRPr lang="en-US"/>
           </a:p>
@@ -1796,7 +1796,7 @@
           <a:p>
             <a:fld id="{799B01D3-E541-42FD-B1E6-9E7097F8E480}" type="datetimeFigureOut">
               <a:rPr lang="en-US" smtClean="0"/>
-              <a:t>9/27/2020</a:t>
+              <a:t>10/2/2020</a:t>
             </a:fld>
             <a:endParaRPr lang="en-US"/>
           </a:p>
@@ -1913,7 +1913,7 @@
           <a:p>
             <a:fld id="{799B01D3-E541-42FD-B1E6-9E7097F8E480}" type="datetimeFigureOut">
               <a:rPr lang="en-US" smtClean="0"/>
-              <a:t>9/27/2020</a:t>
+              <a:t>10/2/2020</a:t>
             </a:fld>
             <a:endParaRPr lang="en-US"/>
           </a:p>
@@ -2008,7 +2008,7 @@
           <a:p>
             <a:fld id="{799B01D3-E541-42FD-B1E6-9E7097F8E480}" type="datetimeFigureOut">
               <a:rPr lang="en-US" smtClean="0"/>
-              <a:t>9/27/2020</a:t>
+              <a:t>10/2/2020</a:t>
             </a:fld>
             <a:endParaRPr lang="en-US"/>
           </a:p>
@@ -2283,7 +2283,7 @@
           <a:p>
             <a:fld id="{799B01D3-E541-42FD-B1E6-9E7097F8E480}" type="datetimeFigureOut">
               <a:rPr lang="en-US" smtClean="0"/>
-              <a:t>9/27/2020</a:t>
+              <a:t>10/2/2020</a:t>
             </a:fld>
             <a:endParaRPr lang="en-US"/>
           </a:p>
@@ -2535,7 +2535,7 @@
           <a:p>
             <a:fld id="{799B01D3-E541-42FD-B1E6-9E7097F8E480}" type="datetimeFigureOut">
               <a:rPr lang="en-US" smtClean="0"/>
-              <a:t>9/27/2020</a:t>
+              <a:t>10/2/2020</a:t>
             </a:fld>
             <a:endParaRPr lang="en-US"/>
           </a:p>
@@ -2746,7 +2746,7 @@
           <a:p>
             <a:fld id="{799B01D3-E541-42FD-B1E6-9E7097F8E480}" type="datetimeFigureOut">
               <a:rPr lang="en-US" smtClean="0"/>
-              <a:t>9/27/2020</a:t>
+              <a:t>10/2/2020</a:t>
             </a:fld>
             <a:endParaRPr lang="en-US"/>
           </a:p>
@@ -4561,7 +4561,15 @@
             </a:pPr>
             <a:r>
               <a:rPr lang="en-US" sz="2000" dirty="0"/>
-              <a:t>Requires only Python + two easily “pip install”-able modules</a:t>
+              <a:t>Requires only Python + </a:t>
+            </a:r>
+            <a:r>
+              <a:rPr lang="en-US" sz="2000" dirty="0" err="1"/>
+              <a:t>jira</a:t>
+            </a:r>
+            <a:r>
+              <a:rPr lang="en-US" sz="2000" dirty="0"/>
+              <a:t> module (easily “pip install”-able)</a:t>
             </a:r>
           </a:p>
           <a:p>

</xml_diff>